<commit_message>
Första utkastet till övning 9
</commit_message>
<xml_diff>
--- a/Bilder.pptx
+++ b/Bilder.pptx
@@ -6,6 +6,7 @@
   </p:sldMasterIdLst>
   <p:sldIdLst>
     <p:sldId id="256" r:id="rId2"/>
+    <p:sldId id="257" r:id="rId3"/>
   </p:sldIdLst>
   <p:sldSz cx="9144000" cy="6858000" type="screen4x3"/>
   <p:notesSz cx="6858000" cy="9144000"/>
@@ -289,7 +290,7 @@
             <a:fld id="{ACC95176-8BDC-4E89-B6AB-E9DCC0B27E6F}" type="datetimeFigureOut">
               <a:rPr lang="sv-SE" smtClean="0"/>
               <a:pPr/>
-              <a:t>2022-12-05</a:t>
+              <a:t>2022-12-12</a:t>
             </a:fld>
             <a:endParaRPr lang="sv-SE" dirty="0"/>
           </a:p>
@@ -456,7 +457,7 @@
             <a:fld id="{ACC95176-8BDC-4E89-B6AB-E9DCC0B27E6F}" type="datetimeFigureOut">
               <a:rPr lang="sv-SE" smtClean="0"/>
               <a:pPr/>
-              <a:t>2022-12-05</a:t>
+              <a:t>2022-12-12</a:t>
             </a:fld>
             <a:endParaRPr lang="sv-SE" dirty="0"/>
           </a:p>
@@ -633,7 +634,7 @@
             <a:fld id="{ACC95176-8BDC-4E89-B6AB-E9DCC0B27E6F}" type="datetimeFigureOut">
               <a:rPr lang="sv-SE" smtClean="0"/>
               <a:pPr/>
-              <a:t>2022-12-05</a:t>
+              <a:t>2022-12-12</a:t>
             </a:fld>
             <a:endParaRPr lang="sv-SE" dirty="0"/>
           </a:p>
@@ -800,7 +801,7 @@
             <a:fld id="{ACC95176-8BDC-4E89-B6AB-E9DCC0B27E6F}" type="datetimeFigureOut">
               <a:rPr lang="sv-SE" smtClean="0"/>
               <a:pPr/>
-              <a:t>2022-12-05</a:t>
+              <a:t>2022-12-12</a:t>
             </a:fld>
             <a:endParaRPr lang="sv-SE" dirty="0"/>
           </a:p>
@@ -1043,7 +1044,7 @@
             <a:fld id="{ACC95176-8BDC-4E89-B6AB-E9DCC0B27E6F}" type="datetimeFigureOut">
               <a:rPr lang="sv-SE" smtClean="0"/>
               <a:pPr/>
-              <a:t>2022-12-05</a:t>
+              <a:t>2022-12-12</a:t>
             </a:fld>
             <a:endParaRPr lang="sv-SE" dirty="0"/>
           </a:p>
@@ -1328,7 +1329,7 @@
             <a:fld id="{ACC95176-8BDC-4E89-B6AB-E9DCC0B27E6F}" type="datetimeFigureOut">
               <a:rPr lang="sv-SE" smtClean="0"/>
               <a:pPr/>
-              <a:t>2022-12-05</a:t>
+              <a:t>2022-12-12</a:t>
             </a:fld>
             <a:endParaRPr lang="sv-SE" dirty="0"/>
           </a:p>
@@ -1747,7 +1748,7 @@
             <a:fld id="{ACC95176-8BDC-4E89-B6AB-E9DCC0B27E6F}" type="datetimeFigureOut">
               <a:rPr lang="sv-SE" smtClean="0"/>
               <a:pPr/>
-              <a:t>2022-12-05</a:t>
+              <a:t>2022-12-12</a:t>
             </a:fld>
             <a:endParaRPr lang="sv-SE" dirty="0"/>
           </a:p>
@@ -1862,7 +1863,7 @@
             <a:fld id="{ACC95176-8BDC-4E89-B6AB-E9DCC0B27E6F}" type="datetimeFigureOut">
               <a:rPr lang="sv-SE" smtClean="0"/>
               <a:pPr/>
-              <a:t>2022-12-05</a:t>
+              <a:t>2022-12-12</a:t>
             </a:fld>
             <a:endParaRPr lang="sv-SE" dirty="0"/>
           </a:p>
@@ -1954,7 +1955,7 @@
             <a:fld id="{ACC95176-8BDC-4E89-B6AB-E9DCC0B27E6F}" type="datetimeFigureOut">
               <a:rPr lang="sv-SE" smtClean="0"/>
               <a:pPr/>
-              <a:t>2022-12-05</a:t>
+              <a:t>2022-12-12</a:t>
             </a:fld>
             <a:endParaRPr lang="sv-SE" dirty="0"/>
           </a:p>
@@ -2228,7 +2229,7 @@
             <a:fld id="{ACC95176-8BDC-4E89-B6AB-E9DCC0B27E6F}" type="datetimeFigureOut">
               <a:rPr lang="sv-SE" smtClean="0"/>
               <a:pPr/>
-              <a:t>2022-12-05</a:t>
+              <a:t>2022-12-12</a:t>
             </a:fld>
             <a:endParaRPr lang="sv-SE" dirty="0"/>
           </a:p>
@@ -2478,7 +2479,7 @@
             <a:fld id="{ACC95176-8BDC-4E89-B6AB-E9DCC0B27E6F}" type="datetimeFigureOut">
               <a:rPr lang="sv-SE" smtClean="0"/>
               <a:pPr/>
-              <a:t>2022-12-05</a:t>
+              <a:t>2022-12-12</a:t>
             </a:fld>
             <a:endParaRPr lang="sv-SE" dirty="0"/>
           </a:p>
@@ -2688,7 +2689,7 @@
             <a:fld id="{ACC95176-8BDC-4E89-B6AB-E9DCC0B27E6F}" type="datetimeFigureOut">
               <a:rPr lang="sv-SE" smtClean="0"/>
               <a:pPr/>
-              <a:t>2022-12-05</a:t>
+              <a:t>2022-12-12</a:t>
             </a:fld>
             <a:endParaRPr lang="sv-SE" dirty="0"/>
           </a:p>
@@ -3043,6 +3044,767 @@
 </file>
 
 <file path=ppt/slides/slide1.xml><?xml version="1.0" encoding="utf-8"?>
+<p:sld xmlns:a="http://schemas.openxmlformats.org/drawingml/2006/main" xmlns:r="http://schemas.openxmlformats.org/officeDocument/2006/relationships" xmlns:p="http://schemas.openxmlformats.org/presentationml/2006/main">
+  <p:cSld>
+    <p:spTree>
+      <p:nvGrpSpPr>
+        <p:cNvPr id="1" name=""/>
+        <p:cNvGrpSpPr/>
+        <p:nvPr/>
+      </p:nvGrpSpPr>
+      <p:grpSpPr>
+        <a:xfrm>
+          <a:off x="0" y="0"/>
+          <a:ext cx="0" cy="0"/>
+          <a:chOff x="0" y="0"/>
+          <a:chExt cx="0" cy="0"/>
+        </a:xfrm>
+      </p:grpSpPr>
+      <p:sp>
+        <p:nvSpPr>
+          <p:cNvPr id="7" name="Rektangel 6"/>
+          <p:cNvSpPr/>
+          <p:nvPr/>
+        </p:nvSpPr>
+        <p:spPr>
+          <a:xfrm>
+            <a:off x="785786" y="642918"/>
+            <a:ext cx="3286148" cy="2143140"/>
+          </a:xfrm>
+          <a:prstGeom prst="rect">
+            <a:avLst/>
+          </a:prstGeom>
+          <a:gradFill flip="none" rotWithShape="1">
+            <a:gsLst>
+              <a:gs pos="0">
+                <a:srgbClr val="B2F4E9">
+                  <a:shade val="30000"/>
+                  <a:satMod val="115000"/>
+                </a:srgbClr>
+              </a:gs>
+              <a:gs pos="50000">
+                <a:srgbClr val="B2F4E9">
+                  <a:shade val="67500"/>
+                  <a:satMod val="115000"/>
+                </a:srgbClr>
+              </a:gs>
+              <a:gs pos="100000">
+                <a:srgbClr val="B2F4E9">
+                  <a:shade val="100000"/>
+                  <a:satMod val="115000"/>
+                </a:srgbClr>
+              </a:gs>
+            </a:gsLst>
+            <a:path path="circle">
+              <a:fillToRect l="50000" t="50000" r="50000" b="50000"/>
+            </a:path>
+            <a:tileRect/>
+          </a:gradFill>
+          <a:ln>
+            <a:noFill/>
+          </a:ln>
+        </p:spPr>
+        <p:style>
+          <a:lnRef idx="2">
+            <a:schemeClr val="accent1">
+              <a:shade val="50000"/>
+            </a:schemeClr>
+          </a:lnRef>
+          <a:fillRef idx="1">
+            <a:schemeClr val="accent1"/>
+          </a:fillRef>
+          <a:effectRef idx="0">
+            <a:schemeClr val="accent1"/>
+          </a:effectRef>
+          <a:fontRef idx="minor">
+            <a:schemeClr val="lt1"/>
+          </a:fontRef>
+        </p:style>
+        <p:txBody>
+          <a:bodyPr rtlCol="0" anchor="ctr"/>
+          <a:lstStyle/>
+          <a:p>
+            <a:pPr algn="ctr"/>
+            <a:endParaRPr lang="sv-SE" dirty="0"/>
+          </a:p>
+        </p:txBody>
+      </p:sp>
+      <p:sp>
+        <p:nvSpPr>
+          <p:cNvPr id="8" name="textruta 7"/>
+          <p:cNvSpPr txBox="1"/>
+          <p:nvPr/>
+        </p:nvSpPr>
+        <p:spPr>
+          <a:xfrm>
+            <a:off x="3357554" y="1500174"/>
+            <a:ext cx="644728" cy="369332"/>
+          </a:xfrm>
+          <a:prstGeom prst="rect">
+            <a:avLst/>
+          </a:prstGeom>
+          <a:noFill/>
+        </p:spPr>
+        <p:txBody>
+          <a:bodyPr wrap="none" rtlCol="0">
+            <a:spAutoFit/>
+          </a:bodyPr>
+          <a:lstStyle/>
+          <a:p>
+            <a:r>
+              <a:rPr lang="sv-SE" dirty="0" smtClean="0">
+                <a:solidFill>
+                  <a:schemeClr val="bg1">
+                    <a:lumMod val="85000"/>
+                  </a:schemeClr>
+                </a:solidFill>
+              </a:rPr>
+              <a:t>A    =</a:t>
+            </a:r>
+          </a:p>
+        </p:txBody>
+      </p:sp>
+      <p:sp>
+        <p:nvSpPr>
+          <p:cNvPr id="9" name="textruta 8"/>
+          <p:cNvSpPr txBox="1"/>
+          <p:nvPr/>
+        </p:nvSpPr>
+        <p:spPr>
+          <a:xfrm>
+            <a:off x="857224" y="1500174"/>
+            <a:ext cx="1257075" cy="369332"/>
+          </a:xfrm>
+          <a:prstGeom prst="rect">
+            <a:avLst/>
+          </a:prstGeom>
+          <a:noFill/>
+        </p:spPr>
+        <p:txBody>
+          <a:bodyPr wrap="none" rtlCol="0">
+            <a:spAutoFit/>
+          </a:bodyPr>
+          <a:lstStyle/>
+          <a:p>
+            <a:r>
+              <a:rPr lang="sv-SE" dirty="0" smtClean="0">
+                <a:solidFill>
+                  <a:schemeClr val="bg1">
+                    <a:lumMod val="85000"/>
+                  </a:schemeClr>
+                </a:solidFill>
+              </a:rPr>
+              <a:t>E</a:t>
+            </a:r>
+            <a:r>
+              <a:rPr lang="sv-SE" baseline="-25000" dirty="0" smtClean="0">
+                <a:solidFill>
+                  <a:schemeClr val="bg1">
+                    <a:lumMod val="85000"/>
+                  </a:schemeClr>
+                </a:solidFill>
+              </a:rPr>
+              <a:t>1    </a:t>
+            </a:r>
+            <a:r>
+              <a:rPr lang="sv-SE" dirty="0" smtClean="0">
+                <a:solidFill>
+                  <a:schemeClr val="bg1">
+                    <a:lumMod val="85000"/>
+                  </a:schemeClr>
+                </a:solidFill>
+              </a:rPr>
+              <a:t>  +      C</a:t>
+            </a:r>
+            <a:r>
+              <a:rPr lang="sv-SE" baseline="30000" dirty="0" smtClean="0">
+                <a:solidFill>
+                  <a:schemeClr val="bg1">
+                    <a:lumMod val="85000"/>
+                  </a:schemeClr>
+                </a:solidFill>
+              </a:rPr>
+              <a:t>2</a:t>
+            </a:r>
+            <a:endParaRPr lang="sv-SE" baseline="30000" dirty="0">
+              <a:solidFill>
+                <a:schemeClr val="bg1">
+                  <a:lumMod val="85000"/>
+                </a:schemeClr>
+              </a:solidFill>
+            </a:endParaRPr>
+          </a:p>
+        </p:txBody>
+      </p:sp>
+      <p:cxnSp>
+        <p:nvCxnSpPr>
+          <p:cNvPr id="14" name="Rak 13"/>
+          <p:cNvCxnSpPr/>
+          <p:nvPr/>
+        </p:nvCxnSpPr>
+        <p:spPr>
+          <a:xfrm rot="5400000">
+            <a:off x="1429919" y="1713297"/>
+            <a:ext cx="2142346" cy="1588"/>
+          </a:xfrm>
+          <a:prstGeom prst="line">
+            <a:avLst/>
+          </a:prstGeom>
+          <a:ln>
+            <a:solidFill>
+              <a:schemeClr val="bg1">
+                <a:lumMod val="85000"/>
+              </a:schemeClr>
+            </a:solidFill>
+          </a:ln>
+        </p:spPr>
+        <p:style>
+          <a:lnRef idx="1">
+            <a:schemeClr val="accent1"/>
+          </a:lnRef>
+          <a:fillRef idx="0">
+            <a:schemeClr val="accent1"/>
+          </a:fillRef>
+          <a:effectRef idx="0">
+            <a:schemeClr val="accent1"/>
+          </a:effectRef>
+          <a:fontRef idx="minor">
+            <a:schemeClr val="tx1"/>
+          </a:fontRef>
+        </p:style>
+      </p:cxnSp>
+      <p:cxnSp>
+        <p:nvCxnSpPr>
+          <p:cNvPr id="17" name="Rak 16"/>
+          <p:cNvCxnSpPr/>
+          <p:nvPr/>
+        </p:nvCxnSpPr>
+        <p:spPr>
+          <a:xfrm rot="10800000">
+            <a:off x="785786" y="1928802"/>
+            <a:ext cx="1643074" cy="1588"/>
+          </a:xfrm>
+          <a:prstGeom prst="line">
+            <a:avLst/>
+          </a:prstGeom>
+          <a:ln>
+            <a:solidFill>
+              <a:schemeClr val="bg1">
+                <a:lumMod val="85000"/>
+              </a:schemeClr>
+            </a:solidFill>
+          </a:ln>
+        </p:spPr>
+        <p:style>
+          <a:lnRef idx="1">
+            <a:schemeClr val="accent1"/>
+          </a:lnRef>
+          <a:fillRef idx="0">
+            <a:schemeClr val="accent1"/>
+          </a:fillRef>
+          <a:effectRef idx="0">
+            <a:schemeClr val="accent1"/>
+          </a:effectRef>
+          <a:fontRef idx="minor">
+            <a:schemeClr val="tx1"/>
+          </a:fontRef>
+        </p:style>
+      </p:cxnSp>
+      <p:cxnSp>
+        <p:nvCxnSpPr>
+          <p:cNvPr id="20" name="Rak 19"/>
+          <p:cNvCxnSpPr/>
+          <p:nvPr/>
+        </p:nvCxnSpPr>
+        <p:spPr>
+          <a:xfrm rot="10800000">
+            <a:off x="2571736" y="1928802"/>
+            <a:ext cx="285752" cy="1588"/>
+          </a:xfrm>
+          <a:prstGeom prst="line">
+            <a:avLst/>
+          </a:prstGeom>
+          <a:ln>
+            <a:solidFill>
+              <a:schemeClr val="bg1">
+                <a:lumMod val="85000"/>
+              </a:schemeClr>
+            </a:solidFill>
+          </a:ln>
+        </p:spPr>
+        <p:style>
+          <a:lnRef idx="1">
+            <a:schemeClr val="accent1"/>
+          </a:lnRef>
+          <a:fillRef idx="0">
+            <a:schemeClr val="accent1"/>
+          </a:fillRef>
+          <a:effectRef idx="0">
+            <a:schemeClr val="accent1"/>
+          </a:effectRef>
+          <a:fontRef idx="minor">
+            <a:schemeClr val="tx1"/>
+          </a:fontRef>
+        </p:style>
+      </p:cxnSp>
+      <p:cxnSp>
+        <p:nvCxnSpPr>
+          <p:cNvPr id="31" name="Rak 30"/>
+          <p:cNvCxnSpPr/>
+          <p:nvPr/>
+        </p:nvCxnSpPr>
+        <p:spPr>
+          <a:xfrm>
+            <a:off x="3000364" y="2071678"/>
+            <a:ext cx="285752" cy="1588"/>
+          </a:xfrm>
+          <a:prstGeom prst="line">
+            <a:avLst/>
+          </a:prstGeom>
+          <a:ln>
+            <a:solidFill>
+              <a:schemeClr val="bg1">
+                <a:lumMod val="85000"/>
+              </a:schemeClr>
+            </a:solidFill>
+          </a:ln>
+        </p:spPr>
+        <p:style>
+          <a:lnRef idx="1">
+            <a:schemeClr val="accent1"/>
+          </a:lnRef>
+          <a:fillRef idx="0">
+            <a:schemeClr val="accent1"/>
+          </a:fillRef>
+          <a:effectRef idx="0">
+            <a:schemeClr val="accent1"/>
+          </a:effectRef>
+          <a:fontRef idx="minor">
+            <a:schemeClr val="tx1"/>
+          </a:fontRef>
+        </p:style>
+      </p:cxnSp>
+      <p:cxnSp>
+        <p:nvCxnSpPr>
+          <p:cNvPr id="34" name="Rak 33"/>
+          <p:cNvCxnSpPr/>
+          <p:nvPr/>
+        </p:nvCxnSpPr>
+        <p:spPr>
+          <a:xfrm rot="16200000" flipH="1">
+            <a:off x="2857488" y="1928802"/>
+            <a:ext cx="142876" cy="142876"/>
+          </a:xfrm>
+          <a:prstGeom prst="line">
+            <a:avLst/>
+          </a:prstGeom>
+          <a:ln>
+            <a:solidFill>
+              <a:schemeClr val="bg1">
+                <a:lumMod val="85000"/>
+              </a:schemeClr>
+            </a:solidFill>
+          </a:ln>
+        </p:spPr>
+        <p:style>
+          <a:lnRef idx="1">
+            <a:schemeClr val="accent1"/>
+          </a:lnRef>
+          <a:fillRef idx="0">
+            <a:schemeClr val="accent1"/>
+          </a:fillRef>
+          <a:effectRef idx="0">
+            <a:schemeClr val="accent1"/>
+          </a:effectRef>
+          <a:fontRef idx="minor">
+            <a:schemeClr val="tx1"/>
+          </a:fontRef>
+        </p:style>
+      </p:cxnSp>
+      <p:cxnSp>
+        <p:nvCxnSpPr>
+          <p:cNvPr id="44" name="Rak 43"/>
+          <p:cNvCxnSpPr/>
+          <p:nvPr/>
+        </p:nvCxnSpPr>
+        <p:spPr>
+          <a:xfrm rot="5400000">
+            <a:off x="722661" y="563167"/>
+            <a:ext cx="142876" cy="1588"/>
+          </a:xfrm>
+          <a:prstGeom prst="line">
+            <a:avLst/>
+          </a:prstGeom>
+        </p:spPr>
+        <p:style>
+          <a:lnRef idx="1">
+            <a:schemeClr val="accent1"/>
+          </a:lnRef>
+          <a:fillRef idx="0">
+            <a:schemeClr val="accent1"/>
+          </a:fillRef>
+          <a:effectRef idx="0">
+            <a:schemeClr val="accent1"/>
+          </a:effectRef>
+          <a:fontRef idx="minor">
+            <a:schemeClr val="tx1"/>
+          </a:fontRef>
+        </p:style>
+      </p:cxnSp>
+      <p:cxnSp>
+        <p:nvCxnSpPr>
+          <p:cNvPr id="45" name="Rak 44"/>
+          <p:cNvCxnSpPr/>
+          <p:nvPr/>
+        </p:nvCxnSpPr>
+        <p:spPr>
+          <a:xfrm rot="5400000">
+            <a:off x="3992977" y="2865015"/>
+            <a:ext cx="142876" cy="1588"/>
+          </a:xfrm>
+          <a:prstGeom prst="line">
+            <a:avLst/>
+          </a:prstGeom>
+        </p:spPr>
+        <p:style>
+          <a:lnRef idx="1">
+            <a:schemeClr val="accent1"/>
+          </a:lnRef>
+          <a:fillRef idx="0">
+            <a:schemeClr val="accent1"/>
+          </a:fillRef>
+          <a:effectRef idx="0">
+            <a:schemeClr val="accent1"/>
+          </a:effectRef>
+          <a:fontRef idx="minor">
+            <a:schemeClr val="tx1"/>
+          </a:fontRef>
+        </p:style>
+      </p:cxnSp>
+      <p:cxnSp>
+        <p:nvCxnSpPr>
+          <p:cNvPr id="46" name="Rak 45"/>
+          <p:cNvCxnSpPr/>
+          <p:nvPr/>
+        </p:nvCxnSpPr>
+        <p:spPr>
+          <a:xfrm rot="10800000">
+            <a:off x="4080247" y="2777745"/>
+            <a:ext cx="142876" cy="1588"/>
+          </a:xfrm>
+          <a:prstGeom prst="line">
+            <a:avLst/>
+          </a:prstGeom>
+        </p:spPr>
+        <p:style>
+          <a:lnRef idx="1">
+            <a:schemeClr val="accent1"/>
+          </a:lnRef>
+          <a:fillRef idx="0">
+            <a:schemeClr val="accent1"/>
+          </a:fillRef>
+          <a:effectRef idx="0">
+            <a:schemeClr val="accent1"/>
+          </a:effectRef>
+          <a:fontRef idx="minor">
+            <a:schemeClr val="tx1"/>
+          </a:fontRef>
+        </p:style>
+      </p:cxnSp>
+      <p:cxnSp>
+        <p:nvCxnSpPr>
+          <p:cNvPr id="48" name="Rak 47"/>
+          <p:cNvCxnSpPr/>
+          <p:nvPr/>
+        </p:nvCxnSpPr>
+        <p:spPr>
+          <a:xfrm rot="10800000">
+            <a:off x="634597" y="651231"/>
+            <a:ext cx="142876" cy="1588"/>
+          </a:xfrm>
+          <a:prstGeom prst="line">
+            <a:avLst/>
+          </a:prstGeom>
+        </p:spPr>
+        <p:style>
+          <a:lnRef idx="1">
+            <a:schemeClr val="accent1"/>
+          </a:lnRef>
+          <a:fillRef idx="0">
+            <a:schemeClr val="accent1"/>
+          </a:fillRef>
+          <a:effectRef idx="0">
+            <a:schemeClr val="accent1"/>
+          </a:effectRef>
+          <a:fontRef idx="minor">
+            <a:schemeClr val="tx1"/>
+          </a:fontRef>
+        </p:style>
+      </p:cxnSp>
+      <p:cxnSp>
+        <p:nvCxnSpPr>
+          <p:cNvPr id="43" name="Rak 42"/>
+          <p:cNvCxnSpPr/>
+          <p:nvPr/>
+        </p:nvCxnSpPr>
+        <p:spPr>
+          <a:xfrm rot="10800000">
+            <a:off x="3857620" y="1928802"/>
+            <a:ext cx="214314" cy="1588"/>
+          </a:xfrm>
+          <a:prstGeom prst="line">
+            <a:avLst/>
+          </a:prstGeom>
+          <a:ln>
+            <a:solidFill>
+              <a:schemeClr val="bg1">
+                <a:lumMod val="85000"/>
+              </a:schemeClr>
+            </a:solidFill>
+          </a:ln>
+        </p:spPr>
+        <p:style>
+          <a:lnRef idx="1">
+            <a:schemeClr val="accent1"/>
+          </a:lnRef>
+          <a:fillRef idx="0">
+            <a:schemeClr val="accent1"/>
+          </a:fillRef>
+          <a:effectRef idx="0">
+            <a:schemeClr val="accent1"/>
+          </a:effectRef>
+          <a:fontRef idx="minor">
+            <a:schemeClr val="tx1"/>
+          </a:fontRef>
+        </p:style>
+      </p:cxnSp>
+      <p:cxnSp>
+        <p:nvCxnSpPr>
+          <p:cNvPr id="50" name="Rak 49"/>
+          <p:cNvCxnSpPr/>
+          <p:nvPr/>
+        </p:nvCxnSpPr>
+        <p:spPr>
+          <a:xfrm rot="10800000">
+            <a:off x="2500298" y="1785926"/>
+            <a:ext cx="71438" cy="1588"/>
+          </a:xfrm>
+          <a:prstGeom prst="line">
+            <a:avLst/>
+          </a:prstGeom>
+          <a:ln>
+            <a:solidFill>
+              <a:schemeClr val="bg1">
+                <a:lumMod val="85000"/>
+              </a:schemeClr>
+            </a:solidFill>
+          </a:ln>
+        </p:spPr>
+        <p:style>
+          <a:lnRef idx="1">
+            <a:schemeClr val="accent1"/>
+          </a:lnRef>
+          <a:fillRef idx="0">
+            <a:schemeClr val="accent1"/>
+          </a:fillRef>
+          <a:effectRef idx="0">
+            <a:schemeClr val="accent1"/>
+          </a:effectRef>
+          <a:fontRef idx="minor">
+            <a:schemeClr val="tx1"/>
+          </a:fontRef>
+        </p:style>
+      </p:cxnSp>
+      <p:cxnSp>
+        <p:nvCxnSpPr>
+          <p:cNvPr id="52" name="Rak 51"/>
+          <p:cNvCxnSpPr/>
+          <p:nvPr/>
+        </p:nvCxnSpPr>
+        <p:spPr>
+          <a:xfrm rot="10800000">
+            <a:off x="2500298" y="928670"/>
+            <a:ext cx="71438" cy="1588"/>
+          </a:xfrm>
+          <a:prstGeom prst="line">
+            <a:avLst/>
+          </a:prstGeom>
+          <a:ln>
+            <a:solidFill>
+              <a:schemeClr val="bg1">
+                <a:lumMod val="85000"/>
+              </a:schemeClr>
+            </a:solidFill>
+          </a:ln>
+        </p:spPr>
+        <p:style>
+          <a:lnRef idx="1">
+            <a:schemeClr val="accent1"/>
+          </a:lnRef>
+          <a:fillRef idx="0">
+            <a:schemeClr val="accent1"/>
+          </a:fillRef>
+          <a:effectRef idx="0">
+            <a:schemeClr val="accent1"/>
+          </a:effectRef>
+          <a:fontRef idx="minor">
+            <a:schemeClr val="tx1"/>
+          </a:fontRef>
+        </p:style>
+      </p:cxnSp>
+      <p:cxnSp>
+        <p:nvCxnSpPr>
+          <p:cNvPr id="27" name="Rak 26"/>
+          <p:cNvCxnSpPr/>
+          <p:nvPr/>
+        </p:nvCxnSpPr>
+        <p:spPr>
+          <a:xfrm rot="5400000">
+            <a:off x="4580313" y="3492125"/>
+            <a:ext cx="142876" cy="1588"/>
+          </a:xfrm>
+          <a:prstGeom prst="line">
+            <a:avLst/>
+          </a:prstGeom>
+        </p:spPr>
+        <p:style>
+          <a:lnRef idx="1">
+            <a:schemeClr val="accent1"/>
+          </a:lnRef>
+          <a:fillRef idx="0">
+            <a:schemeClr val="accent1"/>
+          </a:fillRef>
+          <a:effectRef idx="0">
+            <a:schemeClr val="accent1"/>
+          </a:effectRef>
+          <a:fontRef idx="minor">
+            <a:schemeClr val="tx1"/>
+          </a:fontRef>
+        </p:style>
+      </p:cxnSp>
+      <p:cxnSp>
+        <p:nvCxnSpPr>
+          <p:cNvPr id="28" name="Rak 27"/>
+          <p:cNvCxnSpPr/>
+          <p:nvPr/>
+        </p:nvCxnSpPr>
+        <p:spPr>
+          <a:xfrm rot="5400000">
+            <a:off x="7850629" y="5793973"/>
+            <a:ext cx="142876" cy="1588"/>
+          </a:xfrm>
+          <a:prstGeom prst="line">
+            <a:avLst/>
+          </a:prstGeom>
+        </p:spPr>
+        <p:style>
+          <a:lnRef idx="1">
+            <a:schemeClr val="accent1"/>
+          </a:lnRef>
+          <a:fillRef idx="0">
+            <a:schemeClr val="accent1"/>
+          </a:fillRef>
+          <a:effectRef idx="0">
+            <a:schemeClr val="accent1"/>
+          </a:effectRef>
+          <a:fontRef idx="minor">
+            <a:schemeClr val="tx1"/>
+          </a:fontRef>
+        </p:style>
+      </p:cxnSp>
+      <p:cxnSp>
+        <p:nvCxnSpPr>
+          <p:cNvPr id="29" name="Rak 28"/>
+          <p:cNvCxnSpPr/>
+          <p:nvPr/>
+        </p:nvCxnSpPr>
+        <p:spPr>
+          <a:xfrm rot="10800000">
+            <a:off x="7937899" y="5706703"/>
+            <a:ext cx="142876" cy="1588"/>
+          </a:xfrm>
+          <a:prstGeom prst="line">
+            <a:avLst/>
+          </a:prstGeom>
+        </p:spPr>
+        <p:style>
+          <a:lnRef idx="1">
+            <a:schemeClr val="accent1"/>
+          </a:lnRef>
+          <a:fillRef idx="0">
+            <a:schemeClr val="accent1"/>
+          </a:fillRef>
+          <a:effectRef idx="0">
+            <a:schemeClr val="accent1"/>
+          </a:effectRef>
+          <a:fontRef idx="minor">
+            <a:schemeClr val="tx1"/>
+          </a:fontRef>
+        </p:style>
+      </p:cxnSp>
+      <p:cxnSp>
+        <p:nvCxnSpPr>
+          <p:cNvPr id="30" name="Rak 29"/>
+          <p:cNvCxnSpPr/>
+          <p:nvPr/>
+        </p:nvCxnSpPr>
+        <p:spPr>
+          <a:xfrm rot="10800000">
+            <a:off x="4492249" y="3580189"/>
+            <a:ext cx="142876" cy="1588"/>
+          </a:xfrm>
+          <a:prstGeom prst="line">
+            <a:avLst/>
+          </a:prstGeom>
+        </p:spPr>
+        <p:style>
+          <a:lnRef idx="1">
+            <a:schemeClr val="accent1"/>
+          </a:lnRef>
+          <a:fillRef idx="0">
+            <a:schemeClr val="accent1"/>
+          </a:fillRef>
+          <a:effectRef idx="0">
+            <a:schemeClr val="accent1"/>
+          </a:effectRef>
+          <a:fontRef idx="minor">
+            <a:schemeClr val="tx1"/>
+          </a:fontRef>
+        </p:style>
+      </p:cxnSp>
+      <p:pic>
+        <p:nvPicPr>
+          <p:cNvPr id="36" name="Bildobjekt 35" descr="bg_dodonew.jpg"/>
+          <p:cNvPicPr>
+            <a:picLocks noChangeAspect="1"/>
+          </p:cNvPicPr>
+          <p:nvPr/>
+        </p:nvPicPr>
+        <p:blipFill>
+          <a:blip r:embed="rId2" cstate="print"/>
+          <a:stretch>
+            <a:fillRect/>
+          </a:stretch>
+        </p:blipFill>
+        <p:spPr>
+          <a:xfrm>
+            <a:off x="7286644" y="5143512"/>
+            <a:ext cx="444121" cy="444121"/>
+          </a:xfrm>
+          <a:prstGeom prst="rect">
+            <a:avLst/>
+          </a:prstGeom>
+        </p:spPr>
+      </p:pic>
+    </p:spTree>
+  </p:cSld>
+  <p:clrMapOvr>
+    <a:masterClrMapping/>
+  </p:clrMapOvr>
+</p:sld>
+</file>
+
+<file path=ppt/slides/slide2.xml><?xml version="1.0" encoding="utf-8"?>
 <p:sld xmlns:a="http://schemas.openxmlformats.org/drawingml/2006/main" xmlns:r="http://schemas.openxmlformats.org/officeDocument/2006/relationships" xmlns:p="http://schemas.openxmlformats.org/presentationml/2006/main">
   <p:cSld>
     <p:spTree>

</xml_diff>